<commit_message>
Update functional model figure
Signed-off-by: Mengchi Zhang <zhan2308@purdue.edu>
</commit_message>
<xml_diff>
--- a/figures/scheduler.pptx
+++ b/figures/scheduler.pptx
@@ -5,12 +5,13 @@
     <p:sldMasterId id="2147483648" r:id="rId1"/>
   </p:sldMasterIdLst>
   <p:notesMasterIdLst>
-    <p:notesMasterId r:id="rId5"/>
+    <p:notesMasterId r:id="rId6"/>
   </p:notesMasterIdLst>
   <p:sldIdLst>
-    <p:sldId id="274" r:id="rId2"/>
-    <p:sldId id="275" r:id="rId3"/>
-    <p:sldId id="276" r:id="rId4"/>
+    <p:sldId id="277" r:id="rId2"/>
+    <p:sldId id="274" r:id="rId3"/>
+    <p:sldId id="275" r:id="rId4"/>
+    <p:sldId id="276" r:id="rId5"/>
   </p:sldIdLst>
   <p:sldSz cx="12192000" cy="6858000"/>
   <p:notesSz cx="6858000" cy="9144000"/>
@@ -540,7 +541,7 @@
     </p:spTree>
     <p:extLst>
       <p:ext uri="{BB962C8B-B14F-4D97-AF65-F5344CB8AC3E}">
-        <p14:creationId xmlns:p14="http://schemas.microsoft.com/office/powerpoint/2010/main" val="2200397219"/>
+        <p14:creationId xmlns:p14="http://schemas.microsoft.com/office/powerpoint/2010/main" val="90767322"/>
       </p:ext>
     </p:extLst>
   </p:cSld>
@@ -624,7 +625,7 @@
     </p:spTree>
     <p:extLst>
       <p:ext uri="{BB962C8B-B14F-4D97-AF65-F5344CB8AC3E}">
-        <p14:creationId xmlns:p14="http://schemas.microsoft.com/office/powerpoint/2010/main" val="479701260"/>
+        <p14:creationId xmlns:p14="http://schemas.microsoft.com/office/powerpoint/2010/main" val="2200397219"/>
       </p:ext>
     </p:extLst>
   </p:cSld>
@@ -700,6 +701,90 @@
             <a:fld id="{CF9C09DD-ED21-49A7-9D25-661CD23D2B5E}" type="slidenum">
               <a:rPr lang="en-US" smtClean="0"/>
               <a:t>3</a:t>
+            </a:fld>
+            <a:endParaRPr lang="en-US"/>
+          </a:p>
+        </p:txBody>
+      </p:sp>
+    </p:spTree>
+    <p:extLst>
+      <p:ext uri="{BB962C8B-B14F-4D97-AF65-F5344CB8AC3E}">
+        <p14:creationId xmlns:p14="http://schemas.microsoft.com/office/powerpoint/2010/main" val="479701260"/>
+      </p:ext>
+    </p:extLst>
+  </p:cSld>
+  <p:clrMapOvr>
+    <a:masterClrMapping/>
+  </p:clrMapOvr>
+</p:notes>
+</file>
+
+<file path=ppt/notesSlides/notesSlide4.xml><?xml version="1.0" encoding="utf-8"?>
+<p:notes xmlns:a="http://schemas.openxmlformats.org/drawingml/2006/main" xmlns:r="http://schemas.openxmlformats.org/officeDocument/2006/relationships" xmlns:p="http://schemas.openxmlformats.org/presentationml/2006/main">
+  <p:cSld>
+    <p:spTree>
+      <p:nvGrpSpPr>
+        <p:cNvPr id="1" name=""/>
+        <p:cNvGrpSpPr/>
+        <p:nvPr/>
+      </p:nvGrpSpPr>
+      <p:grpSpPr>
+        <a:xfrm>
+          <a:off x="0" y="0"/>
+          <a:ext cx="0" cy="0"/>
+          <a:chOff x="0" y="0"/>
+          <a:chExt cx="0" cy="0"/>
+        </a:xfrm>
+      </p:grpSpPr>
+      <p:sp>
+        <p:nvSpPr>
+          <p:cNvPr id="2" name="Slide Image Placeholder 1"/>
+          <p:cNvSpPr>
+            <a:spLocks noGrp="1" noRot="1" noChangeAspect="1"/>
+          </p:cNvSpPr>
+          <p:nvPr>
+            <p:ph type="sldImg"/>
+          </p:nvPr>
+        </p:nvSpPr>
+        <p:spPr/>
+      </p:sp>
+      <p:sp>
+        <p:nvSpPr>
+          <p:cNvPr id="3" name="Notes Placeholder 2"/>
+          <p:cNvSpPr>
+            <a:spLocks noGrp="1"/>
+          </p:cNvSpPr>
+          <p:nvPr>
+            <p:ph type="body" idx="1"/>
+          </p:nvPr>
+        </p:nvSpPr>
+        <p:spPr/>
+        <p:txBody>
+          <a:bodyPr/>
+          <a:lstStyle/>
+          <a:p>
+            <a:endParaRPr lang="en-US" dirty="0"/>
+          </a:p>
+        </p:txBody>
+      </p:sp>
+      <p:sp>
+        <p:nvSpPr>
+          <p:cNvPr id="4" name="Slide Number Placeholder 3"/>
+          <p:cNvSpPr>
+            <a:spLocks noGrp="1"/>
+          </p:cNvSpPr>
+          <p:nvPr>
+            <p:ph type="sldNum" sz="quarter" idx="5"/>
+          </p:nvPr>
+        </p:nvSpPr>
+        <p:spPr/>
+        <p:txBody>
+          <a:bodyPr/>
+          <a:lstStyle/>
+          <a:p>
+            <a:fld id="{CF9C09DD-ED21-49A7-9D25-661CD23D2B5E}" type="slidenum">
+              <a:rPr lang="en-US" smtClean="0"/>
+              <a:t>4</a:t>
             </a:fld>
             <a:endParaRPr lang="en-US"/>
           </a:p>
@@ -3916,6 +4001,1694 @@
 </file>
 
 <file path=ppt/slides/slide1.xml><?xml version="1.0" encoding="utf-8"?>
+<p:sld xmlns:a="http://schemas.openxmlformats.org/drawingml/2006/main" xmlns:r="http://schemas.openxmlformats.org/officeDocument/2006/relationships" xmlns:p="http://schemas.openxmlformats.org/presentationml/2006/main">
+  <p:cSld>
+    <p:spTree>
+      <p:nvGrpSpPr>
+        <p:cNvPr id="1" name=""/>
+        <p:cNvGrpSpPr/>
+        <p:nvPr/>
+      </p:nvGrpSpPr>
+      <p:grpSpPr>
+        <a:xfrm>
+          <a:off x="0" y="0"/>
+          <a:ext cx="0" cy="0"/>
+          <a:chOff x="0" y="0"/>
+          <a:chExt cx="0" cy="0"/>
+        </a:xfrm>
+      </p:grpSpPr>
+      <p:sp>
+        <p:nvSpPr>
+          <p:cNvPr id="28" name="Rounded Rectangle 27">
+            <a:extLst>
+              <a:ext uri="{FF2B5EF4-FFF2-40B4-BE49-F238E27FC236}">
+                <a16:creationId xmlns:a16="http://schemas.microsoft.com/office/drawing/2014/main" id="{EC7321D9-3329-4E4C-967F-65E3827E0B2A}"/>
+              </a:ext>
+            </a:extLst>
+          </p:cNvPr>
+          <p:cNvSpPr/>
+          <p:nvPr/>
+        </p:nvSpPr>
+        <p:spPr>
+          <a:xfrm>
+            <a:off x="9754950" y="463981"/>
+            <a:ext cx="1680983" cy="1337839"/>
+          </a:xfrm>
+          <a:prstGeom prst="roundRect">
+            <a:avLst/>
+          </a:prstGeom>
+          <a:solidFill>
+            <a:srgbClr val="13D2FF"/>
+          </a:solidFill>
+          <a:ln w="19050">
+            <a:solidFill>
+              <a:schemeClr val="tx1"/>
+            </a:solidFill>
+          </a:ln>
+        </p:spPr>
+        <p:style>
+          <a:lnRef idx="2">
+            <a:schemeClr val="accent1">
+              <a:shade val="50000"/>
+            </a:schemeClr>
+          </a:lnRef>
+          <a:fillRef idx="1">
+            <a:schemeClr val="accent1"/>
+          </a:fillRef>
+          <a:effectRef idx="0">
+            <a:schemeClr val="accent1"/>
+          </a:effectRef>
+          <a:fontRef idx="minor">
+            <a:schemeClr val="lt1"/>
+          </a:fontRef>
+        </p:style>
+        <p:txBody>
+          <a:bodyPr rtlCol="0" anchor="t"/>
+          <a:lstStyle/>
+          <a:p>
+            <a:pPr algn="ctr"/>
+            <a:r>
+              <a:rPr lang="en-US" altLang="zh-CN" sz="2000" dirty="0">
+                <a:solidFill>
+                  <a:schemeClr val="tx1"/>
+                </a:solidFill>
+              </a:rPr>
+              <a:t>SM</a:t>
+            </a:r>
+            <a:r>
+              <a:rPr lang="zh-CN" altLang="en-US" sz="2000" dirty="0">
+                <a:solidFill>
+                  <a:schemeClr val="tx1"/>
+                </a:solidFill>
+              </a:rPr>
+              <a:t> </a:t>
+            </a:r>
+            <a:r>
+              <a:rPr lang="en-US" altLang="zh-CN" sz="2000" dirty="0">
+                <a:solidFill>
+                  <a:schemeClr val="tx1"/>
+                </a:solidFill>
+              </a:rPr>
+              <a:t>blob</a:t>
+            </a:r>
+            <a:endParaRPr lang="en-US" sz="2000" dirty="0">
+              <a:solidFill>
+                <a:schemeClr val="tx1"/>
+              </a:solidFill>
+            </a:endParaRPr>
+          </a:p>
+        </p:txBody>
+      </p:sp>
+      <p:sp>
+        <p:nvSpPr>
+          <p:cNvPr id="2" name="Rounded Rectangle 1">
+            <a:extLst>
+              <a:ext uri="{FF2B5EF4-FFF2-40B4-BE49-F238E27FC236}">
+                <a16:creationId xmlns:a16="http://schemas.microsoft.com/office/drawing/2014/main" id="{01B9FBCE-4435-4C4C-9E96-E0A73B8730F3}"/>
+              </a:ext>
+            </a:extLst>
+          </p:cNvPr>
+          <p:cNvSpPr/>
+          <p:nvPr/>
+        </p:nvSpPr>
+        <p:spPr>
+          <a:xfrm>
+            <a:off x="3511030" y="840461"/>
+            <a:ext cx="1811747" cy="1337839"/>
+          </a:xfrm>
+          <a:prstGeom prst="roundRect">
+            <a:avLst/>
+          </a:prstGeom>
+          <a:solidFill>
+            <a:srgbClr val="13D2FF"/>
+          </a:solidFill>
+          <a:ln w="19050">
+            <a:solidFill>
+              <a:schemeClr val="tx1"/>
+            </a:solidFill>
+          </a:ln>
+        </p:spPr>
+        <p:style>
+          <a:lnRef idx="2">
+            <a:schemeClr val="accent1">
+              <a:shade val="50000"/>
+            </a:schemeClr>
+          </a:lnRef>
+          <a:fillRef idx="1">
+            <a:schemeClr val="accent1"/>
+          </a:fillRef>
+          <a:effectRef idx="0">
+            <a:schemeClr val="accent1"/>
+          </a:effectRef>
+          <a:fontRef idx="minor">
+            <a:schemeClr val="lt1"/>
+          </a:fontRef>
+        </p:style>
+        <p:txBody>
+          <a:bodyPr rtlCol="0" anchor="t"/>
+          <a:lstStyle/>
+          <a:p>
+            <a:pPr algn="ctr"/>
+            <a:r>
+              <a:rPr lang="en-US" sz="2000" dirty="0">
+                <a:solidFill>
+                  <a:schemeClr val="tx1"/>
+                </a:solidFill>
+              </a:rPr>
+              <a:t>Ariel</a:t>
+            </a:r>
+          </a:p>
+        </p:txBody>
+      </p:sp>
+      <p:sp>
+        <p:nvSpPr>
+          <p:cNvPr id="21" name="Rectangle 20">
+            <a:extLst>
+              <a:ext uri="{FF2B5EF4-FFF2-40B4-BE49-F238E27FC236}">
+                <a16:creationId xmlns:a16="http://schemas.microsoft.com/office/drawing/2014/main" id="{10865AD4-9091-43CE-8AAF-4464F486E31E}"/>
+              </a:ext>
+            </a:extLst>
+          </p:cNvPr>
+          <p:cNvSpPr/>
+          <p:nvPr/>
+        </p:nvSpPr>
+        <p:spPr>
+          <a:xfrm>
+            <a:off x="3950042" y="1330977"/>
+            <a:ext cx="964096" cy="586408"/>
+          </a:xfrm>
+          <a:prstGeom prst="rect">
+            <a:avLst/>
+          </a:prstGeom>
+          <a:solidFill>
+            <a:schemeClr val="accent2">
+              <a:lumMod val="60000"/>
+              <a:lumOff val="40000"/>
+            </a:schemeClr>
+          </a:solidFill>
+          <a:ln w="38100">
+            <a:solidFill>
+              <a:schemeClr val="tx1"/>
+            </a:solidFill>
+          </a:ln>
+        </p:spPr>
+        <p:style>
+          <a:lnRef idx="2">
+            <a:schemeClr val="accent2">
+              <a:shade val="50000"/>
+            </a:schemeClr>
+          </a:lnRef>
+          <a:fillRef idx="1">
+            <a:schemeClr val="accent2"/>
+          </a:fillRef>
+          <a:effectRef idx="0">
+            <a:schemeClr val="accent2"/>
+          </a:effectRef>
+          <a:fontRef idx="minor">
+            <a:schemeClr val="lt1"/>
+          </a:fontRef>
+        </p:style>
+        <p:txBody>
+          <a:bodyPr rtlCol="0" anchor="ctr"/>
+          <a:lstStyle/>
+          <a:p>
+            <a:pPr algn="ctr"/>
+            <a:r>
+              <a:rPr lang="en-US" sz="2000" dirty="0">
+                <a:solidFill>
+                  <a:schemeClr val="tx1"/>
+                </a:solidFill>
+              </a:rPr>
+              <a:t>CPU</a:t>
+            </a:r>
+          </a:p>
+        </p:txBody>
+      </p:sp>
+      <p:sp>
+        <p:nvSpPr>
+          <p:cNvPr id="58" name="Arrow: Left-Right 31">
+            <a:extLst>
+              <a:ext uri="{FF2B5EF4-FFF2-40B4-BE49-F238E27FC236}">
+                <a16:creationId xmlns:a16="http://schemas.microsoft.com/office/drawing/2014/main" id="{50C7562A-7C61-9E42-BEF7-B2FBB7E9AC2B}"/>
+              </a:ext>
+            </a:extLst>
+          </p:cNvPr>
+          <p:cNvSpPr/>
+          <p:nvPr/>
+        </p:nvSpPr>
+        <p:spPr>
+          <a:xfrm>
+            <a:off x="5333164" y="1214019"/>
+            <a:ext cx="1261957" cy="258852"/>
+          </a:xfrm>
+          <a:prstGeom prst="leftRightArrow">
+            <a:avLst/>
+          </a:prstGeom>
+          <a:solidFill>
+            <a:srgbClr val="B0DDF2"/>
+          </a:solidFill>
+          <a:ln w="19050">
+            <a:solidFill>
+              <a:schemeClr val="tx1"/>
+            </a:solidFill>
+          </a:ln>
+        </p:spPr>
+        <p:style>
+          <a:lnRef idx="2">
+            <a:schemeClr val="accent1">
+              <a:shade val="50000"/>
+            </a:schemeClr>
+          </a:lnRef>
+          <a:fillRef idx="1">
+            <a:schemeClr val="accent1"/>
+          </a:fillRef>
+          <a:effectRef idx="0">
+            <a:schemeClr val="accent1"/>
+          </a:effectRef>
+          <a:fontRef idx="minor">
+            <a:schemeClr val="lt1"/>
+          </a:fontRef>
+        </p:style>
+        <p:txBody>
+          <a:bodyPr rtlCol="0" anchor="ctr"/>
+          <a:lstStyle/>
+          <a:p>
+            <a:pPr algn="ctr"/>
+            <a:endParaRPr lang="en-US" sz="2000"/>
+          </a:p>
+        </p:txBody>
+      </p:sp>
+      <p:sp>
+        <p:nvSpPr>
+          <p:cNvPr id="67" name="TextBox 66">
+            <a:extLst>
+              <a:ext uri="{FF2B5EF4-FFF2-40B4-BE49-F238E27FC236}">
+                <a16:creationId xmlns:a16="http://schemas.microsoft.com/office/drawing/2014/main" id="{89B5B1E2-7221-5C41-AFD8-79C42182E21B}"/>
+              </a:ext>
+            </a:extLst>
+          </p:cNvPr>
+          <p:cNvSpPr txBox="1"/>
+          <p:nvPr/>
+        </p:nvSpPr>
+        <p:spPr>
+          <a:xfrm>
+            <a:off x="5305414" y="1470413"/>
+            <a:ext cx="1317456" cy="707886"/>
+          </a:xfrm>
+          <a:prstGeom prst="rect">
+            <a:avLst/>
+          </a:prstGeom>
+          <a:noFill/>
+        </p:spPr>
+        <p:txBody>
+          <a:bodyPr wrap="square" rtlCol="0">
+            <a:spAutoFit/>
+          </a:bodyPr>
+          <a:lstStyle/>
+          <a:p>
+            <a:pPr algn="ctr"/>
+            <a:r>
+              <a:rPr lang="en-US" altLang="zh-CN" sz="2000" dirty="0"/>
+              <a:t>API</a:t>
+            </a:r>
+            <a:r>
+              <a:rPr lang="en-US" sz="2000" dirty="0"/>
+              <a:t> command</a:t>
+            </a:r>
+          </a:p>
+        </p:txBody>
+      </p:sp>
+      <p:sp>
+        <p:nvSpPr>
+          <p:cNvPr id="68" name="TextBox 67">
+            <a:extLst>
+              <a:ext uri="{FF2B5EF4-FFF2-40B4-BE49-F238E27FC236}">
+                <a16:creationId xmlns:a16="http://schemas.microsoft.com/office/drawing/2014/main" id="{B5AFA252-8E64-6341-BF3A-6362A3C2F889}"/>
+              </a:ext>
+            </a:extLst>
+          </p:cNvPr>
+          <p:cNvSpPr txBox="1"/>
+          <p:nvPr/>
+        </p:nvSpPr>
+        <p:spPr>
+          <a:xfrm>
+            <a:off x="8215956" y="1536195"/>
+            <a:ext cx="1374882" cy="1015663"/>
+          </a:xfrm>
+          <a:prstGeom prst="rect">
+            <a:avLst/>
+          </a:prstGeom>
+          <a:noFill/>
+        </p:spPr>
+        <p:txBody>
+          <a:bodyPr wrap="square" rtlCol="0">
+            <a:spAutoFit/>
+          </a:bodyPr>
+          <a:lstStyle/>
+          <a:p>
+            <a:pPr algn="ctr"/>
+            <a:r>
+              <a:rPr lang="en-US" sz="2000" dirty="0"/>
+              <a:t>CTA command</a:t>
+            </a:r>
+          </a:p>
+          <a:p>
+            <a:endParaRPr lang="en-US" sz="2000" dirty="0"/>
+          </a:p>
+        </p:txBody>
+      </p:sp>
+      <p:sp>
+        <p:nvSpPr>
+          <p:cNvPr id="71" name="Arrow: Left-Right 31">
+            <a:extLst>
+              <a:ext uri="{FF2B5EF4-FFF2-40B4-BE49-F238E27FC236}">
+                <a16:creationId xmlns:a16="http://schemas.microsoft.com/office/drawing/2014/main" id="{6C55F45A-E80B-6642-9666-37D0E47D4D26}"/>
+              </a:ext>
+            </a:extLst>
+          </p:cNvPr>
+          <p:cNvSpPr/>
+          <p:nvPr/>
+        </p:nvSpPr>
+        <p:spPr>
+          <a:xfrm>
+            <a:off x="8296464" y="1214019"/>
+            <a:ext cx="1210845" cy="303377"/>
+          </a:xfrm>
+          <a:prstGeom prst="leftRightArrow">
+            <a:avLst/>
+          </a:prstGeom>
+          <a:solidFill>
+            <a:srgbClr val="B0DDF2"/>
+          </a:solidFill>
+          <a:ln w="19050">
+            <a:solidFill>
+              <a:schemeClr val="tx1"/>
+            </a:solidFill>
+          </a:ln>
+        </p:spPr>
+        <p:style>
+          <a:lnRef idx="2">
+            <a:schemeClr val="accent1">
+              <a:shade val="50000"/>
+            </a:schemeClr>
+          </a:lnRef>
+          <a:fillRef idx="1">
+            <a:schemeClr val="accent1"/>
+          </a:fillRef>
+          <a:effectRef idx="0">
+            <a:schemeClr val="accent1"/>
+          </a:effectRef>
+          <a:fontRef idx="minor">
+            <a:schemeClr val="lt1"/>
+          </a:fontRef>
+        </p:style>
+        <p:txBody>
+          <a:bodyPr rtlCol="0" anchor="ctr"/>
+          <a:lstStyle/>
+          <a:p>
+            <a:pPr algn="ctr"/>
+            <a:endParaRPr lang="en-US" sz="2000"/>
+          </a:p>
+        </p:txBody>
+      </p:sp>
+      <p:sp>
+        <p:nvSpPr>
+          <p:cNvPr id="22" name="Rounded Rectangle 21">
+            <a:extLst>
+              <a:ext uri="{FF2B5EF4-FFF2-40B4-BE49-F238E27FC236}">
+                <a16:creationId xmlns:a16="http://schemas.microsoft.com/office/drawing/2014/main" id="{8FABE294-9C11-DB40-93A8-0C1C531F6012}"/>
+              </a:ext>
+            </a:extLst>
+          </p:cNvPr>
+          <p:cNvSpPr/>
+          <p:nvPr/>
+        </p:nvSpPr>
+        <p:spPr>
+          <a:xfrm>
+            <a:off x="6615481" y="840460"/>
+            <a:ext cx="1680983" cy="1337839"/>
+          </a:xfrm>
+          <a:prstGeom prst="roundRect">
+            <a:avLst/>
+          </a:prstGeom>
+          <a:solidFill>
+            <a:srgbClr val="13D2FF"/>
+          </a:solidFill>
+          <a:ln w="19050">
+            <a:solidFill>
+              <a:schemeClr val="tx1"/>
+            </a:solidFill>
+          </a:ln>
+        </p:spPr>
+        <p:style>
+          <a:lnRef idx="2">
+            <a:schemeClr val="accent1">
+              <a:shade val="50000"/>
+            </a:schemeClr>
+          </a:lnRef>
+          <a:fillRef idx="1">
+            <a:schemeClr val="accent1"/>
+          </a:fillRef>
+          <a:effectRef idx="0">
+            <a:schemeClr val="accent1"/>
+          </a:effectRef>
+          <a:fontRef idx="minor">
+            <a:schemeClr val="lt1"/>
+          </a:fontRef>
+        </p:style>
+        <p:txBody>
+          <a:bodyPr rtlCol="0" anchor="ctr"/>
+          <a:lstStyle/>
+          <a:p>
+            <a:pPr algn="ctr"/>
+            <a:r>
+              <a:rPr lang="en-US" sz="2000" dirty="0">
+                <a:solidFill>
+                  <a:schemeClr val="tx1"/>
+                </a:solidFill>
+              </a:rPr>
+              <a:t>GPUSched</a:t>
+            </a:r>
+          </a:p>
+        </p:txBody>
+      </p:sp>
+      <p:sp>
+        <p:nvSpPr>
+          <p:cNvPr id="23" name="Rounded Rectangle 22">
+            <a:extLst>
+              <a:ext uri="{FF2B5EF4-FFF2-40B4-BE49-F238E27FC236}">
+                <a16:creationId xmlns:a16="http://schemas.microsoft.com/office/drawing/2014/main" id="{99FCAE7D-AD1D-424A-8FA8-C0F8C0FF5492}"/>
+              </a:ext>
+            </a:extLst>
+          </p:cNvPr>
+          <p:cNvSpPr/>
+          <p:nvPr/>
+        </p:nvSpPr>
+        <p:spPr>
+          <a:xfrm>
+            <a:off x="9512968" y="953744"/>
+            <a:ext cx="1680983" cy="1337839"/>
+          </a:xfrm>
+          <a:prstGeom prst="roundRect">
+            <a:avLst/>
+          </a:prstGeom>
+          <a:solidFill>
+            <a:srgbClr val="13D2FF"/>
+          </a:solidFill>
+          <a:ln w="19050">
+            <a:solidFill>
+              <a:schemeClr val="tx1"/>
+            </a:solidFill>
+          </a:ln>
+        </p:spPr>
+        <p:style>
+          <a:lnRef idx="2">
+            <a:schemeClr val="accent1">
+              <a:shade val="50000"/>
+            </a:schemeClr>
+          </a:lnRef>
+          <a:fillRef idx="1">
+            <a:schemeClr val="accent1"/>
+          </a:fillRef>
+          <a:effectRef idx="0">
+            <a:schemeClr val="accent1"/>
+          </a:effectRef>
+          <a:fontRef idx="minor">
+            <a:schemeClr val="lt1"/>
+          </a:fontRef>
+        </p:style>
+        <p:txBody>
+          <a:bodyPr rtlCol="0" anchor="t"/>
+          <a:lstStyle/>
+          <a:p>
+            <a:pPr algn="ctr"/>
+            <a:r>
+              <a:rPr lang="en-US" altLang="zh-CN" sz="2000" dirty="0">
+                <a:solidFill>
+                  <a:schemeClr val="tx1"/>
+                </a:solidFill>
+              </a:rPr>
+              <a:t>SM</a:t>
+            </a:r>
+            <a:r>
+              <a:rPr lang="zh-CN" altLang="en-US" sz="2000" dirty="0">
+                <a:solidFill>
+                  <a:schemeClr val="tx1"/>
+                </a:solidFill>
+              </a:rPr>
+              <a:t> </a:t>
+            </a:r>
+            <a:r>
+              <a:rPr lang="en-US" altLang="zh-CN" sz="2000" dirty="0">
+                <a:solidFill>
+                  <a:schemeClr val="tx1"/>
+                </a:solidFill>
+              </a:rPr>
+              <a:t>blob</a:t>
+            </a:r>
+            <a:endParaRPr lang="en-US" sz="2000" dirty="0">
+              <a:solidFill>
+                <a:schemeClr val="tx1"/>
+              </a:solidFill>
+            </a:endParaRPr>
+          </a:p>
+        </p:txBody>
+      </p:sp>
+      <p:sp>
+        <p:nvSpPr>
+          <p:cNvPr id="15" name="Rounded Rectangle 14">
+            <a:extLst>
+              <a:ext uri="{FF2B5EF4-FFF2-40B4-BE49-F238E27FC236}">
+                <a16:creationId xmlns:a16="http://schemas.microsoft.com/office/drawing/2014/main" id="{3354DF32-9700-754E-B106-0561C1EB56BC}"/>
+              </a:ext>
+            </a:extLst>
+          </p:cNvPr>
+          <p:cNvSpPr/>
+          <p:nvPr/>
+        </p:nvSpPr>
+        <p:spPr>
+          <a:xfrm>
+            <a:off x="399470" y="840460"/>
+            <a:ext cx="1811747" cy="1337839"/>
+          </a:xfrm>
+          <a:prstGeom prst="roundRect">
+            <a:avLst/>
+          </a:prstGeom>
+          <a:solidFill>
+            <a:srgbClr val="13D2FF"/>
+          </a:solidFill>
+          <a:ln w="19050">
+            <a:solidFill>
+              <a:schemeClr val="tx1"/>
+            </a:solidFill>
+          </a:ln>
+        </p:spPr>
+        <p:style>
+          <a:lnRef idx="2">
+            <a:schemeClr val="accent1">
+              <a:shade val="50000"/>
+            </a:schemeClr>
+          </a:lnRef>
+          <a:fillRef idx="1">
+            <a:schemeClr val="accent1"/>
+          </a:fillRef>
+          <a:effectRef idx="0">
+            <a:schemeClr val="accent1"/>
+          </a:effectRef>
+          <a:fontRef idx="minor">
+            <a:schemeClr val="lt1"/>
+          </a:fontRef>
+        </p:style>
+        <p:txBody>
+          <a:bodyPr rtlCol="0" anchor="t"/>
+          <a:lstStyle/>
+          <a:p>
+            <a:pPr algn="ctr"/>
+            <a:r>
+              <a:rPr lang="en-US" altLang="zh-CN" sz="2000" dirty="0">
+                <a:solidFill>
+                  <a:schemeClr val="tx1"/>
+                </a:solidFill>
+              </a:rPr>
+              <a:t>PIN</a:t>
+            </a:r>
+            <a:r>
+              <a:rPr lang="zh-CN" altLang="en-US" sz="2000" dirty="0">
+                <a:solidFill>
+                  <a:schemeClr val="tx1"/>
+                </a:solidFill>
+              </a:rPr>
+              <a:t> </a:t>
+            </a:r>
+            <a:r>
+              <a:rPr lang="en-US" altLang="zh-CN" sz="2000" dirty="0">
+                <a:solidFill>
+                  <a:schemeClr val="tx1"/>
+                </a:solidFill>
+              </a:rPr>
+              <a:t>trace</a:t>
+            </a:r>
+            <a:r>
+              <a:rPr lang="zh-CN" altLang="en-US" sz="2000" dirty="0">
+                <a:solidFill>
+                  <a:schemeClr val="tx1"/>
+                </a:solidFill>
+              </a:rPr>
+              <a:t> </a:t>
+            </a:r>
+            <a:r>
+              <a:rPr lang="en-US" altLang="zh-CN" sz="2000" dirty="0">
+                <a:solidFill>
+                  <a:schemeClr val="tx1"/>
+                </a:solidFill>
+              </a:rPr>
+              <a:t>Lib</a:t>
+            </a:r>
+            <a:endParaRPr lang="en-US" sz="2000" dirty="0">
+              <a:solidFill>
+                <a:schemeClr val="tx1"/>
+              </a:solidFill>
+            </a:endParaRPr>
+          </a:p>
+        </p:txBody>
+      </p:sp>
+      <p:sp>
+        <p:nvSpPr>
+          <p:cNvPr id="16" name="Rectangle 15">
+            <a:extLst>
+              <a:ext uri="{FF2B5EF4-FFF2-40B4-BE49-F238E27FC236}">
+                <a16:creationId xmlns:a16="http://schemas.microsoft.com/office/drawing/2014/main" id="{8CF5D9C0-8543-E04B-9570-C3CA3542A3E8}"/>
+              </a:ext>
+            </a:extLst>
+          </p:cNvPr>
+          <p:cNvSpPr/>
+          <p:nvPr/>
+        </p:nvSpPr>
+        <p:spPr>
+          <a:xfrm>
+            <a:off x="809717" y="1460167"/>
+            <a:ext cx="964096" cy="586408"/>
+          </a:xfrm>
+          <a:prstGeom prst="rect">
+            <a:avLst/>
+          </a:prstGeom>
+          <a:solidFill>
+            <a:schemeClr val="accent2">
+              <a:lumMod val="60000"/>
+              <a:lumOff val="40000"/>
+            </a:schemeClr>
+          </a:solidFill>
+          <a:ln w="38100">
+            <a:solidFill>
+              <a:schemeClr val="tx1"/>
+            </a:solidFill>
+          </a:ln>
+        </p:spPr>
+        <p:style>
+          <a:lnRef idx="2">
+            <a:schemeClr val="accent2">
+              <a:shade val="50000"/>
+            </a:schemeClr>
+          </a:lnRef>
+          <a:fillRef idx="1">
+            <a:schemeClr val="accent2"/>
+          </a:fillRef>
+          <a:effectRef idx="0">
+            <a:schemeClr val="accent2"/>
+          </a:effectRef>
+          <a:fontRef idx="minor">
+            <a:schemeClr val="lt1"/>
+          </a:fontRef>
+        </p:style>
+        <p:txBody>
+          <a:bodyPr rtlCol="0" anchor="ctr"/>
+          <a:lstStyle/>
+          <a:p>
+            <a:pPr algn="ctr"/>
+            <a:r>
+              <a:rPr lang="en-US" altLang="zh-CN" sz="2000" dirty="0">
+                <a:solidFill>
+                  <a:schemeClr val="tx1"/>
+                </a:solidFill>
+              </a:rPr>
+              <a:t>App</a:t>
+            </a:r>
+            <a:endParaRPr lang="en-US" sz="2000" dirty="0">
+              <a:solidFill>
+                <a:schemeClr val="tx1"/>
+              </a:solidFill>
+            </a:endParaRPr>
+          </a:p>
+        </p:txBody>
+      </p:sp>
+      <p:sp>
+        <p:nvSpPr>
+          <p:cNvPr id="17" name="Rounded Rectangle 16">
+            <a:extLst>
+              <a:ext uri="{FF2B5EF4-FFF2-40B4-BE49-F238E27FC236}">
+                <a16:creationId xmlns:a16="http://schemas.microsoft.com/office/drawing/2014/main" id="{B1E18E69-D67D-0B4A-AB51-233750BA34B7}"/>
+              </a:ext>
+            </a:extLst>
+          </p:cNvPr>
+          <p:cNvSpPr/>
+          <p:nvPr/>
+        </p:nvSpPr>
+        <p:spPr>
+          <a:xfrm>
+            <a:off x="3950043" y="3657600"/>
+            <a:ext cx="2875446" cy="1479300"/>
+          </a:xfrm>
+          <a:prstGeom prst="roundRect">
+            <a:avLst>
+              <a:gd name="adj" fmla="val 7808"/>
+            </a:avLst>
+          </a:prstGeom>
+          <a:solidFill>
+            <a:srgbClr val="CBE5FF"/>
+          </a:solidFill>
+          <a:ln w="19050">
+            <a:solidFill>
+              <a:schemeClr val="tx1"/>
+            </a:solidFill>
+          </a:ln>
+        </p:spPr>
+        <p:style>
+          <a:lnRef idx="2">
+            <a:schemeClr val="accent1">
+              <a:shade val="50000"/>
+            </a:schemeClr>
+          </a:lnRef>
+          <a:fillRef idx="1">
+            <a:schemeClr val="accent1"/>
+          </a:fillRef>
+          <a:effectRef idx="0">
+            <a:schemeClr val="accent1"/>
+          </a:effectRef>
+          <a:fontRef idx="minor">
+            <a:schemeClr val="lt1"/>
+          </a:fontRef>
+        </p:style>
+        <p:txBody>
+          <a:bodyPr rtlCol="0" anchor="ctr"/>
+          <a:lstStyle/>
+          <a:p>
+            <a:pPr algn="ctr"/>
+            <a:r>
+              <a:rPr lang="en-US" altLang="zh-CN" sz="2000" dirty="0">
+                <a:solidFill>
+                  <a:schemeClr val="tx1"/>
+                </a:solidFill>
+              </a:rPr>
+              <a:t>CPU</a:t>
+            </a:r>
+            <a:r>
+              <a:rPr lang="zh-CN" altLang="en-US" sz="2000" dirty="0">
+                <a:solidFill>
+                  <a:schemeClr val="tx1"/>
+                </a:solidFill>
+              </a:rPr>
+              <a:t> </a:t>
+            </a:r>
+            <a:r>
+              <a:rPr lang="en-US" altLang="zh-CN" sz="2000" dirty="0">
+                <a:solidFill>
+                  <a:schemeClr val="tx1"/>
+                </a:solidFill>
+              </a:rPr>
+              <a:t>memory</a:t>
+            </a:r>
+            <a:endParaRPr lang="en-US" sz="2000" dirty="0">
+              <a:solidFill>
+                <a:schemeClr val="tx1"/>
+              </a:solidFill>
+            </a:endParaRPr>
+          </a:p>
+        </p:txBody>
+      </p:sp>
+      <p:sp>
+        <p:nvSpPr>
+          <p:cNvPr id="18" name="Rounded Rectangle 17">
+            <a:extLst>
+              <a:ext uri="{FF2B5EF4-FFF2-40B4-BE49-F238E27FC236}">
+                <a16:creationId xmlns:a16="http://schemas.microsoft.com/office/drawing/2014/main" id="{4414A960-CFE1-A34E-A2BF-2BD3AC1ADF42}"/>
+              </a:ext>
+            </a:extLst>
+          </p:cNvPr>
+          <p:cNvSpPr/>
+          <p:nvPr/>
+        </p:nvSpPr>
+        <p:spPr>
+          <a:xfrm>
+            <a:off x="7455971" y="3657600"/>
+            <a:ext cx="3324323" cy="1544968"/>
+          </a:xfrm>
+          <a:prstGeom prst="roundRect">
+            <a:avLst>
+              <a:gd name="adj" fmla="val 7808"/>
+            </a:avLst>
+          </a:prstGeom>
+          <a:solidFill>
+            <a:srgbClr val="CBE5FF"/>
+          </a:solidFill>
+          <a:ln w="19050">
+            <a:solidFill>
+              <a:schemeClr val="tx1"/>
+            </a:solidFill>
+          </a:ln>
+        </p:spPr>
+        <p:style>
+          <a:lnRef idx="2">
+            <a:schemeClr val="accent1">
+              <a:shade val="50000"/>
+            </a:schemeClr>
+          </a:lnRef>
+          <a:fillRef idx="1">
+            <a:schemeClr val="accent1"/>
+          </a:fillRef>
+          <a:effectRef idx="0">
+            <a:schemeClr val="accent1"/>
+          </a:effectRef>
+          <a:fontRef idx="minor">
+            <a:schemeClr val="lt1"/>
+          </a:fontRef>
+        </p:style>
+        <p:txBody>
+          <a:bodyPr rtlCol="0" anchor="ctr"/>
+          <a:lstStyle/>
+          <a:p>
+            <a:pPr algn="ctr"/>
+            <a:r>
+              <a:rPr lang="en-US" altLang="zh-CN" sz="2000" dirty="0">
+                <a:solidFill>
+                  <a:schemeClr val="tx1"/>
+                </a:solidFill>
+              </a:rPr>
+              <a:t>GPU</a:t>
+            </a:r>
+            <a:r>
+              <a:rPr lang="zh-CN" altLang="en-US" sz="2000" dirty="0">
+                <a:solidFill>
+                  <a:schemeClr val="tx1"/>
+                </a:solidFill>
+              </a:rPr>
+              <a:t> </a:t>
+            </a:r>
+            <a:r>
+              <a:rPr lang="en-US" altLang="zh-CN" sz="2000" dirty="0">
+                <a:solidFill>
+                  <a:schemeClr val="tx1"/>
+                </a:solidFill>
+              </a:rPr>
+              <a:t>memory</a:t>
+            </a:r>
+            <a:endParaRPr lang="en-US" sz="2000" dirty="0">
+              <a:solidFill>
+                <a:schemeClr val="tx1"/>
+              </a:solidFill>
+            </a:endParaRPr>
+          </a:p>
+        </p:txBody>
+      </p:sp>
+      <p:sp>
+        <p:nvSpPr>
+          <p:cNvPr id="20" name="Arrow: Left-Right 31">
+            <a:extLst>
+              <a:ext uri="{FF2B5EF4-FFF2-40B4-BE49-F238E27FC236}">
+                <a16:creationId xmlns:a16="http://schemas.microsoft.com/office/drawing/2014/main" id="{90D01C4A-63EE-0E4E-A9E1-3D2B938853A5}"/>
+              </a:ext>
+            </a:extLst>
+          </p:cNvPr>
+          <p:cNvSpPr/>
+          <p:nvPr/>
+        </p:nvSpPr>
+        <p:spPr>
+          <a:xfrm>
+            <a:off x="2228713" y="1132900"/>
+            <a:ext cx="1261957" cy="258852"/>
+          </a:xfrm>
+          <a:prstGeom prst="leftRightArrow">
+            <a:avLst/>
+          </a:prstGeom>
+          <a:solidFill>
+            <a:srgbClr val="B0DDF2"/>
+          </a:solidFill>
+          <a:ln w="19050">
+            <a:solidFill>
+              <a:schemeClr val="tx1"/>
+            </a:solidFill>
+          </a:ln>
+        </p:spPr>
+        <p:style>
+          <a:lnRef idx="2">
+            <a:schemeClr val="accent1">
+              <a:shade val="50000"/>
+            </a:schemeClr>
+          </a:lnRef>
+          <a:fillRef idx="1">
+            <a:schemeClr val="accent1"/>
+          </a:fillRef>
+          <a:effectRef idx="0">
+            <a:schemeClr val="accent1"/>
+          </a:effectRef>
+          <a:fontRef idx="minor">
+            <a:schemeClr val="lt1"/>
+          </a:fontRef>
+        </p:style>
+        <p:txBody>
+          <a:bodyPr rtlCol="0" anchor="ctr"/>
+          <a:lstStyle/>
+          <a:p>
+            <a:pPr algn="ctr"/>
+            <a:endParaRPr lang="en-US" sz="2000"/>
+          </a:p>
+        </p:txBody>
+      </p:sp>
+      <p:sp>
+        <p:nvSpPr>
+          <p:cNvPr id="29" name="TextBox 28">
+            <a:extLst>
+              <a:ext uri="{FF2B5EF4-FFF2-40B4-BE49-F238E27FC236}">
+                <a16:creationId xmlns:a16="http://schemas.microsoft.com/office/drawing/2014/main" id="{E851C819-306C-B147-BC00-6074C2D8E1D5}"/>
+              </a:ext>
+            </a:extLst>
+          </p:cNvPr>
+          <p:cNvSpPr txBox="1"/>
+          <p:nvPr/>
+        </p:nvSpPr>
+        <p:spPr>
+          <a:xfrm>
+            <a:off x="2216876" y="486517"/>
+            <a:ext cx="1317456" cy="707886"/>
+          </a:xfrm>
+          <a:prstGeom prst="rect">
+            <a:avLst/>
+          </a:prstGeom>
+          <a:noFill/>
+        </p:spPr>
+        <p:txBody>
+          <a:bodyPr wrap="square" rtlCol="0">
+            <a:spAutoFit/>
+          </a:bodyPr>
+          <a:lstStyle/>
+          <a:p>
+            <a:pPr algn="ctr"/>
+            <a:r>
+              <a:rPr lang="en-US" altLang="zh-CN" sz="2000" dirty="0"/>
+              <a:t>API</a:t>
+            </a:r>
+            <a:r>
+              <a:rPr lang="en-US" sz="2000" dirty="0"/>
+              <a:t> command</a:t>
+            </a:r>
+          </a:p>
+        </p:txBody>
+      </p:sp>
+      <p:cxnSp>
+        <p:nvCxnSpPr>
+          <p:cNvPr id="30" name="Straight Arrow Connector 29">
+            <a:extLst>
+              <a:ext uri="{FF2B5EF4-FFF2-40B4-BE49-F238E27FC236}">
+                <a16:creationId xmlns:a16="http://schemas.microsoft.com/office/drawing/2014/main" id="{67BD0AD6-FD70-B14C-8654-BB1FC6186172}"/>
+              </a:ext>
+            </a:extLst>
+          </p:cNvPr>
+          <p:cNvCxnSpPr>
+            <a:cxnSpLocks/>
+          </p:cNvCxnSpPr>
+          <p:nvPr/>
+        </p:nvCxnSpPr>
+        <p:spPr>
+          <a:xfrm>
+            <a:off x="2211217" y="1753076"/>
+            <a:ext cx="1323115" cy="0"/>
+          </a:xfrm>
+          <a:prstGeom prst="straightConnector1">
+            <a:avLst/>
+          </a:prstGeom>
+          <a:ln w="38100">
+            <a:solidFill>
+              <a:schemeClr val="tx1"/>
+            </a:solidFill>
+            <a:headEnd type="triangle" w="med" len="med"/>
+            <a:tailEnd type="triangle" w="med" len="med"/>
+          </a:ln>
+        </p:spPr>
+        <p:style>
+          <a:lnRef idx="1">
+            <a:schemeClr val="accent1"/>
+          </a:lnRef>
+          <a:fillRef idx="0">
+            <a:schemeClr val="accent1"/>
+          </a:fillRef>
+          <a:effectRef idx="0">
+            <a:schemeClr val="accent1"/>
+          </a:effectRef>
+          <a:fontRef idx="minor">
+            <a:schemeClr val="tx1"/>
+          </a:fontRef>
+        </p:style>
+      </p:cxnSp>
+      <p:sp>
+        <p:nvSpPr>
+          <p:cNvPr id="31" name="TextBox 30">
+            <a:extLst>
+              <a:ext uri="{FF2B5EF4-FFF2-40B4-BE49-F238E27FC236}">
+                <a16:creationId xmlns:a16="http://schemas.microsoft.com/office/drawing/2014/main" id="{659D5434-8CC1-BC4E-B325-6DF67C8EDEAC}"/>
+              </a:ext>
+            </a:extLst>
+          </p:cNvPr>
+          <p:cNvSpPr txBox="1"/>
+          <p:nvPr/>
+        </p:nvSpPr>
+        <p:spPr>
+          <a:xfrm>
+            <a:off x="2173214" y="1905829"/>
+            <a:ext cx="1317456" cy="400110"/>
+          </a:xfrm>
+          <a:prstGeom prst="rect">
+            <a:avLst/>
+          </a:prstGeom>
+          <a:noFill/>
+        </p:spPr>
+        <p:txBody>
+          <a:bodyPr wrap="square" rtlCol="0">
+            <a:spAutoFit/>
+          </a:bodyPr>
+          <a:lstStyle/>
+          <a:p>
+            <a:pPr algn="ctr"/>
+            <a:r>
+              <a:rPr lang="en-US" altLang="zh-CN" sz="2000" dirty="0"/>
+              <a:t>4KiB</a:t>
+            </a:r>
+            <a:r>
+              <a:rPr lang="zh-CN" altLang="en-US" sz="2000" dirty="0"/>
+              <a:t> </a:t>
+            </a:r>
+            <a:r>
+              <a:rPr lang="en-US" altLang="zh-CN" sz="2000" dirty="0"/>
+              <a:t>size</a:t>
+            </a:r>
+            <a:endParaRPr lang="en-US" sz="2000" dirty="0"/>
+          </a:p>
+        </p:txBody>
+      </p:sp>
+      <p:cxnSp>
+        <p:nvCxnSpPr>
+          <p:cNvPr id="32" name="Straight Arrow Connector 31">
+            <a:extLst>
+              <a:ext uri="{FF2B5EF4-FFF2-40B4-BE49-F238E27FC236}">
+                <a16:creationId xmlns:a16="http://schemas.microsoft.com/office/drawing/2014/main" id="{3DD59588-80F4-284C-B1EB-A646C1EB6ADB}"/>
+              </a:ext>
+            </a:extLst>
+          </p:cNvPr>
+          <p:cNvCxnSpPr>
+            <a:cxnSpLocks/>
+            <a:stCxn id="21" idx="2"/>
+          </p:cNvCxnSpPr>
+          <p:nvPr/>
+        </p:nvCxnSpPr>
+        <p:spPr>
+          <a:xfrm>
+            <a:off x="4432090" y="1917385"/>
+            <a:ext cx="1098038" cy="1740214"/>
+          </a:xfrm>
+          <a:prstGeom prst="straightConnector1">
+            <a:avLst/>
+          </a:prstGeom>
+          <a:ln w="38100">
+            <a:solidFill>
+              <a:schemeClr val="tx1"/>
+            </a:solidFill>
+            <a:headEnd type="triangle" w="med" len="med"/>
+            <a:tailEnd type="triangle" w="med" len="med"/>
+          </a:ln>
+        </p:spPr>
+        <p:style>
+          <a:lnRef idx="1">
+            <a:schemeClr val="accent1"/>
+          </a:lnRef>
+          <a:fillRef idx="0">
+            <a:schemeClr val="accent1"/>
+          </a:fillRef>
+          <a:effectRef idx="0">
+            <a:schemeClr val="accent1"/>
+          </a:effectRef>
+          <a:fontRef idx="minor">
+            <a:schemeClr val="tx1"/>
+          </a:fontRef>
+        </p:style>
+      </p:cxnSp>
+      <p:cxnSp>
+        <p:nvCxnSpPr>
+          <p:cNvPr id="33" name="Straight Arrow Connector 32">
+            <a:extLst>
+              <a:ext uri="{FF2B5EF4-FFF2-40B4-BE49-F238E27FC236}">
+                <a16:creationId xmlns:a16="http://schemas.microsoft.com/office/drawing/2014/main" id="{37DD49D4-80E7-D74F-B1D3-A64EFE7D419F}"/>
+              </a:ext>
+            </a:extLst>
+          </p:cNvPr>
+          <p:cNvCxnSpPr>
+            <a:cxnSpLocks/>
+            <a:stCxn id="22" idx="2"/>
+          </p:cNvCxnSpPr>
+          <p:nvPr/>
+        </p:nvCxnSpPr>
+        <p:spPr>
+          <a:xfrm flipH="1">
+            <a:off x="5535787" y="2178299"/>
+            <a:ext cx="1920186" cy="1479300"/>
+          </a:xfrm>
+          <a:prstGeom prst="straightConnector1">
+            <a:avLst/>
+          </a:prstGeom>
+          <a:ln w="38100">
+            <a:solidFill>
+              <a:schemeClr val="tx1"/>
+            </a:solidFill>
+            <a:headEnd type="triangle" w="med" len="med"/>
+            <a:tailEnd type="triangle" w="med" len="med"/>
+          </a:ln>
+        </p:spPr>
+        <p:style>
+          <a:lnRef idx="1">
+            <a:schemeClr val="accent1"/>
+          </a:lnRef>
+          <a:fillRef idx="0">
+            <a:schemeClr val="accent1"/>
+          </a:fillRef>
+          <a:effectRef idx="0">
+            <a:schemeClr val="accent1"/>
+          </a:effectRef>
+          <a:fontRef idx="minor">
+            <a:schemeClr val="tx1"/>
+          </a:fontRef>
+        </p:style>
+      </p:cxnSp>
+      <p:cxnSp>
+        <p:nvCxnSpPr>
+          <p:cNvPr id="35" name="Straight Arrow Connector 34">
+            <a:extLst>
+              <a:ext uri="{FF2B5EF4-FFF2-40B4-BE49-F238E27FC236}">
+                <a16:creationId xmlns:a16="http://schemas.microsoft.com/office/drawing/2014/main" id="{3C79CF14-F190-D54B-96F3-4EA7AE150A35}"/>
+              </a:ext>
+            </a:extLst>
+          </p:cNvPr>
+          <p:cNvCxnSpPr>
+            <a:cxnSpLocks/>
+            <a:stCxn id="22" idx="2"/>
+            <a:endCxn id="18" idx="0"/>
+          </p:cNvCxnSpPr>
+          <p:nvPr/>
+        </p:nvCxnSpPr>
+        <p:spPr>
+          <a:xfrm>
+            <a:off x="7455973" y="2178299"/>
+            <a:ext cx="1662160" cy="1479301"/>
+          </a:xfrm>
+          <a:prstGeom prst="straightConnector1">
+            <a:avLst/>
+          </a:prstGeom>
+          <a:ln w="38100">
+            <a:solidFill>
+              <a:schemeClr val="tx1"/>
+            </a:solidFill>
+            <a:headEnd type="triangle" w="med" len="med"/>
+            <a:tailEnd type="triangle" w="med" len="med"/>
+          </a:ln>
+        </p:spPr>
+        <p:style>
+          <a:lnRef idx="1">
+            <a:schemeClr val="accent1"/>
+          </a:lnRef>
+          <a:fillRef idx="0">
+            <a:schemeClr val="accent1"/>
+          </a:fillRef>
+          <a:effectRef idx="0">
+            <a:schemeClr val="accent1"/>
+          </a:effectRef>
+          <a:fontRef idx="minor">
+            <a:schemeClr val="tx1"/>
+          </a:fontRef>
+        </p:style>
+      </p:cxnSp>
+      <p:cxnSp>
+        <p:nvCxnSpPr>
+          <p:cNvPr id="38" name="Straight Arrow Connector 37">
+            <a:extLst>
+              <a:ext uri="{FF2B5EF4-FFF2-40B4-BE49-F238E27FC236}">
+                <a16:creationId xmlns:a16="http://schemas.microsoft.com/office/drawing/2014/main" id="{372A9C89-F0E4-1C4C-853E-50C63918CC28}"/>
+              </a:ext>
+            </a:extLst>
+          </p:cNvPr>
+          <p:cNvCxnSpPr>
+            <a:cxnSpLocks/>
+            <a:stCxn id="23" idx="2"/>
+            <a:endCxn id="18" idx="0"/>
+          </p:cNvCxnSpPr>
+          <p:nvPr/>
+        </p:nvCxnSpPr>
+        <p:spPr>
+          <a:xfrm flipH="1">
+            <a:off x="9118133" y="2291583"/>
+            <a:ext cx="1235327" cy="1366017"/>
+          </a:xfrm>
+          <a:prstGeom prst="straightConnector1">
+            <a:avLst/>
+          </a:prstGeom>
+          <a:ln w="38100">
+            <a:solidFill>
+              <a:schemeClr val="tx1"/>
+            </a:solidFill>
+            <a:headEnd type="triangle" w="med" len="med"/>
+            <a:tailEnd type="triangle" w="med" len="med"/>
+          </a:ln>
+        </p:spPr>
+        <p:style>
+          <a:lnRef idx="1">
+            <a:schemeClr val="accent1"/>
+          </a:lnRef>
+          <a:fillRef idx="0">
+            <a:schemeClr val="accent1"/>
+          </a:fillRef>
+          <a:effectRef idx="0">
+            <a:schemeClr val="accent1"/>
+          </a:effectRef>
+          <a:fontRef idx="minor">
+            <a:schemeClr val="tx1"/>
+          </a:fontRef>
+        </p:style>
+      </p:cxnSp>
+      <p:sp>
+        <p:nvSpPr>
+          <p:cNvPr id="41" name="TextBox 40">
+            <a:extLst>
+              <a:ext uri="{FF2B5EF4-FFF2-40B4-BE49-F238E27FC236}">
+                <a16:creationId xmlns:a16="http://schemas.microsoft.com/office/drawing/2014/main" id="{07A88E29-6215-1E4D-82F3-D23C45CE6EA5}"/>
+              </a:ext>
+            </a:extLst>
+          </p:cNvPr>
+          <p:cNvSpPr txBox="1"/>
+          <p:nvPr/>
+        </p:nvSpPr>
+        <p:spPr>
+          <a:xfrm>
+            <a:off x="3316458" y="2598450"/>
+            <a:ext cx="1575534" cy="400110"/>
+          </a:xfrm>
+          <a:prstGeom prst="rect">
+            <a:avLst/>
+          </a:prstGeom>
+          <a:noFill/>
+        </p:spPr>
+        <p:txBody>
+          <a:bodyPr wrap="square" rtlCol="0">
+            <a:spAutoFit/>
+          </a:bodyPr>
+          <a:lstStyle/>
+          <a:p>
+            <a:pPr algn="ctr"/>
+            <a:r>
+              <a:rPr lang="en-US" altLang="zh-CN" sz="2000" dirty="0"/>
+              <a:t>memcpy</a:t>
+            </a:r>
+            <a:r>
+              <a:rPr lang="zh-CN" altLang="en-US" sz="2000" dirty="0"/>
+              <a:t> </a:t>
+            </a:r>
+            <a:r>
+              <a:rPr lang="en-US" altLang="zh-CN" sz="2000" dirty="0"/>
+              <a:t>size</a:t>
+            </a:r>
+            <a:endParaRPr lang="en-US" sz="2000" dirty="0"/>
+          </a:p>
+        </p:txBody>
+      </p:sp>
+      <p:sp>
+        <p:nvSpPr>
+          <p:cNvPr id="42" name="TextBox 41">
+            <a:extLst>
+              <a:ext uri="{FF2B5EF4-FFF2-40B4-BE49-F238E27FC236}">
+                <a16:creationId xmlns:a16="http://schemas.microsoft.com/office/drawing/2014/main" id="{B9FA384F-1782-3048-9628-DC74A97ECACB}"/>
+              </a:ext>
+            </a:extLst>
+          </p:cNvPr>
+          <p:cNvSpPr txBox="1"/>
+          <p:nvPr/>
+        </p:nvSpPr>
+        <p:spPr>
+          <a:xfrm>
+            <a:off x="4954405" y="2398395"/>
+            <a:ext cx="1575534" cy="400110"/>
+          </a:xfrm>
+          <a:prstGeom prst="rect">
+            <a:avLst/>
+          </a:prstGeom>
+          <a:noFill/>
+        </p:spPr>
+        <p:txBody>
+          <a:bodyPr wrap="square" rtlCol="0">
+            <a:spAutoFit/>
+          </a:bodyPr>
+          <a:lstStyle/>
+          <a:p>
+            <a:pPr algn="ctr"/>
+            <a:r>
+              <a:rPr lang="en-US" altLang="zh-CN" sz="2000" dirty="0"/>
+              <a:t>memcpy</a:t>
+            </a:r>
+            <a:r>
+              <a:rPr lang="zh-CN" altLang="en-US" sz="2000" dirty="0"/>
+              <a:t> </a:t>
+            </a:r>
+            <a:r>
+              <a:rPr lang="en-US" altLang="zh-CN" sz="2000" dirty="0"/>
+              <a:t>size</a:t>
+            </a:r>
+            <a:endParaRPr lang="en-US" sz="2000" dirty="0"/>
+          </a:p>
+        </p:txBody>
+      </p:sp>
+      <p:sp>
+        <p:nvSpPr>
+          <p:cNvPr id="43" name="Arrow: Left-Right 31">
+            <a:extLst>
+              <a:ext uri="{FF2B5EF4-FFF2-40B4-BE49-F238E27FC236}">
+                <a16:creationId xmlns:a16="http://schemas.microsoft.com/office/drawing/2014/main" id="{CAC7EEE1-8823-2448-AFAF-B50C756DE707}"/>
+              </a:ext>
+            </a:extLst>
+          </p:cNvPr>
+          <p:cNvSpPr/>
+          <p:nvPr/>
+        </p:nvSpPr>
+        <p:spPr>
+          <a:xfrm>
+            <a:off x="1685814" y="3994398"/>
+            <a:ext cx="1261957" cy="258852"/>
+          </a:xfrm>
+          <a:prstGeom prst="leftRightArrow">
+            <a:avLst/>
+          </a:prstGeom>
+          <a:solidFill>
+            <a:srgbClr val="B0DDF2"/>
+          </a:solidFill>
+          <a:ln w="19050">
+            <a:solidFill>
+              <a:schemeClr val="tx1"/>
+            </a:solidFill>
+          </a:ln>
+        </p:spPr>
+        <p:style>
+          <a:lnRef idx="2">
+            <a:schemeClr val="accent1">
+              <a:shade val="50000"/>
+            </a:schemeClr>
+          </a:lnRef>
+          <a:fillRef idx="1">
+            <a:schemeClr val="accent1"/>
+          </a:fillRef>
+          <a:effectRef idx="0">
+            <a:schemeClr val="accent1"/>
+          </a:effectRef>
+          <a:fontRef idx="minor">
+            <a:schemeClr val="lt1"/>
+          </a:fontRef>
+        </p:style>
+        <p:txBody>
+          <a:bodyPr rtlCol="0" anchor="ctr"/>
+          <a:lstStyle/>
+          <a:p>
+            <a:pPr algn="ctr"/>
+            <a:endParaRPr lang="en-US" sz="2000"/>
+          </a:p>
+        </p:txBody>
+      </p:sp>
+      <p:sp>
+        <p:nvSpPr>
+          <p:cNvPr id="44" name="TextBox 43">
+            <a:extLst>
+              <a:ext uri="{FF2B5EF4-FFF2-40B4-BE49-F238E27FC236}">
+                <a16:creationId xmlns:a16="http://schemas.microsoft.com/office/drawing/2014/main" id="{88957FFD-9289-884B-8BFA-50055A34B9AC}"/>
+              </a:ext>
+            </a:extLst>
+          </p:cNvPr>
+          <p:cNvSpPr txBox="1"/>
+          <p:nvPr/>
+        </p:nvSpPr>
+        <p:spPr>
+          <a:xfrm>
+            <a:off x="437628" y="3923769"/>
+            <a:ext cx="1317456" cy="400110"/>
+          </a:xfrm>
+          <a:prstGeom prst="rect">
+            <a:avLst/>
+          </a:prstGeom>
+          <a:noFill/>
+        </p:spPr>
+        <p:txBody>
+          <a:bodyPr wrap="square" rtlCol="0">
+            <a:spAutoFit/>
+          </a:bodyPr>
+          <a:lstStyle/>
+          <a:p>
+            <a:pPr algn="ctr"/>
+            <a:r>
+              <a:rPr lang="en-US" sz="2000" dirty="0"/>
+              <a:t>command</a:t>
+            </a:r>
+          </a:p>
+        </p:txBody>
+      </p:sp>
+      <p:sp>
+        <p:nvSpPr>
+          <p:cNvPr id="45" name="TextBox 44">
+            <a:extLst>
+              <a:ext uri="{FF2B5EF4-FFF2-40B4-BE49-F238E27FC236}">
+                <a16:creationId xmlns:a16="http://schemas.microsoft.com/office/drawing/2014/main" id="{34F65E0F-15BD-DB45-B588-C221CF6734A6}"/>
+              </a:ext>
+            </a:extLst>
+          </p:cNvPr>
+          <p:cNvSpPr txBox="1"/>
+          <p:nvPr/>
+        </p:nvSpPr>
+        <p:spPr>
+          <a:xfrm>
+            <a:off x="492669" y="4357653"/>
+            <a:ext cx="1317456" cy="400110"/>
+          </a:xfrm>
+          <a:prstGeom prst="rect">
+            <a:avLst/>
+          </a:prstGeom>
+          <a:noFill/>
+        </p:spPr>
+        <p:txBody>
+          <a:bodyPr wrap="square" rtlCol="0">
+            <a:spAutoFit/>
+          </a:bodyPr>
+          <a:lstStyle/>
+          <a:p>
+            <a:pPr algn="ctr"/>
+            <a:r>
+              <a:rPr lang="en-US" altLang="zh-CN" sz="2000" dirty="0"/>
+              <a:t>data</a:t>
+            </a:r>
+            <a:endParaRPr lang="en-US" sz="2000" dirty="0"/>
+          </a:p>
+        </p:txBody>
+      </p:sp>
+      <p:cxnSp>
+        <p:nvCxnSpPr>
+          <p:cNvPr id="46" name="Straight Arrow Connector 45">
+            <a:extLst>
+              <a:ext uri="{FF2B5EF4-FFF2-40B4-BE49-F238E27FC236}">
+                <a16:creationId xmlns:a16="http://schemas.microsoft.com/office/drawing/2014/main" id="{1C451A55-5756-D94E-898D-20BF00AC9739}"/>
+              </a:ext>
+            </a:extLst>
+          </p:cNvPr>
+          <p:cNvCxnSpPr>
+            <a:cxnSpLocks/>
+          </p:cNvCxnSpPr>
+          <p:nvPr/>
+        </p:nvCxnSpPr>
+        <p:spPr>
+          <a:xfrm>
+            <a:off x="1685814" y="4557708"/>
+            <a:ext cx="1323115" cy="0"/>
+          </a:xfrm>
+          <a:prstGeom prst="straightConnector1">
+            <a:avLst/>
+          </a:prstGeom>
+          <a:ln w="38100">
+            <a:solidFill>
+              <a:schemeClr val="tx1"/>
+            </a:solidFill>
+            <a:headEnd type="triangle" w="med" len="med"/>
+            <a:tailEnd type="triangle" w="med" len="med"/>
+          </a:ln>
+        </p:spPr>
+        <p:style>
+          <a:lnRef idx="1">
+            <a:schemeClr val="accent1"/>
+          </a:lnRef>
+          <a:fillRef idx="0">
+            <a:schemeClr val="accent1"/>
+          </a:fillRef>
+          <a:effectRef idx="0">
+            <a:schemeClr val="accent1"/>
+          </a:effectRef>
+          <a:fontRef idx="minor">
+            <a:schemeClr val="tx1"/>
+          </a:fontRef>
+        </p:style>
+      </p:cxnSp>
+      <p:sp>
+        <p:nvSpPr>
+          <p:cNvPr id="47" name="Rectangle 46">
+            <a:extLst>
+              <a:ext uri="{FF2B5EF4-FFF2-40B4-BE49-F238E27FC236}">
+                <a16:creationId xmlns:a16="http://schemas.microsoft.com/office/drawing/2014/main" id="{B2ECB57E-43C4-924D-A5CB-2A0A8B1E5FC7}"/>
+              </a:ext>
+            </a:extLst>
+          </p:cNvPr>
+          <p:cNvSpPr/>
+          <p:nvPr/>
+        </p:nvSpPr>
+        <p:spPr>
+          <a:xfrm>
+            <a:off x="441012" y="3657599"/>
+            <a:ext cx="2875446" cy="1337839"/>
+          </a:xfrm>
+          <a:prstGeom prst="rect">
+            <a:avLst/>
+          </a:prstGeom>
+          <a:noFill/>
+          <a:ln w="38100">
+            <a:solidFill>
+              <a:schemeClr val="tx1"/>
+            </a:solidFill>
+          </a:ln>
+        </p:spPr>
+        <p:style>
+          <a:lnRef idx="2">
+            <a:schemeClr val="accent2">
+              <a:shade val="50000"/>
+            </a:schemeClr>
+          </a:lnRef>
+          <a:fillRef idx="1">
+            <a:schemeClr val="accent2"/>
+          </a:fillRef>
+          <a:effectRef idx="0">
+            <a:schemeClr val="accent2"/>
+          </a:effectRef>
+          <a:fontRef idx="minor">
+            <a:schemeClr val="lt1"/>
+          </a:fontRef>
+        </p:style>
+        <p:txBody>
+          <a:bodyPr rtlCol="0" anchor="ctr"/>
+          <a:lstStyle/>
+          <a:p>
+            <a:pPr algn="ctr"/>
+            <a:endParaRPr lang="en-US" sz="2000" dirty="0">
+              <a:solidFill>
+                <a:schemeClr val="tx1"/>
+              </a:solidFill>
+            </a:endParaRPr>
+          </a:p>
+        </p:txBody>
+      </p:sp>
+      <p:sp>
+        <p:nvSpPr>
+          <p:cNvPr id="48" name="TextBox 47">
+            <a:extLst>
+              <a:ext uri="{FF2B5EF4-FFF2-40B4-BE49-F238E27FC236}">
+                <a16:creationId xmlns:a16="http://schemas.microsoft.com/office/drawing/2014/main" id="{4497F381-D576-8C45-BB1A-E479F5538B27}"/>
+              </a:ext>
+            </a:extLst>
+          </p:cNvPr>
+          <p:cNvSpPr txBox="1"/>
+          <p:nvPr/>
+        </p:nvSpPr>
+        <p:spPr>
+          <a:xfrm>
+            <a:off x="6852370" y="2967703"/>
+            <a:ext cx="1575534" cy="400110"/>
+          </a:xfrm>
+          <a:prstGeom prst="rect">
+            <a:avLst/>
+          </a:prstGeom>
+          <a:noFill/>
+        </p:spPr>
+        <p:txBody>
+          <a:bodyPr wrap="square" rtlCol="0">
+            <a:spAutoFit/>
+          </a:bodyPr>
+          <a:lstStyle/>
+          <a:p>
+            <a:pPr algn="ctr"/>
+            <a:r>
+              <a:rPr lang="en-US" altLang="zh-CN" sz="2000" dirty="0"/>
+              <a:t>partition</a:t>
+            </a:r>
+            <a:r>
+              <a:rPr lang="zh-CN" altLang="en-US" sz="2000" dirty="0"/>
+              <a:t> </a:t>
+            </a:r>
+            <a:r>
+              <a:rPr lang="en-US" altLang="zh-CN" sz="2000" dirty="0"/>
+              <a:t>size</a:t>
+            </a:r>
+            <a:endParaRPr lang="en-US" sz="2000" dirty="0"/>
+          </a:p>
+        </p:txBody>
+      </p:sp>
+      <p:sp>
+        <p:nvSpPr>
+          <p:cNvPr id="49" name="TextBox 48">
+            <a:extLst>
+              <a:ext uri="{FF2B5EF4-FFF2-40B4-BE49-F238E27FC236}">
+                <a16:creationId xmlns:a16="http://schemas.microsoft.com/office/drawing/2014/main" id="{E5002A88-CB37-784C-BDBE-6B5CDC102FE9}"/>
+              </a:ext>
+            </a:extLst>
+          </p:cNvPr>
+          <p:cNvSpPr txBox="1"/>
+          <p:nvPr/>
+        </p:nvSpPr>
+        <p:spPr>
+          <a:xfrm>
+            <a:off x="9721170" y="2879795"/>
+            <a:ext cx="1680982" cy="400110"/>
+          </a:xfrm>
+          <a:prstGeom prst="rect">
+            <a:avLst/>
+          </a:prstGeom>
+          <a:noFill/>
+        </p:spPr>
+        <p:txBody>
+          <a:bodyPr wrap="square" rtlCol="0">
+            <a:spAutoFit/>
+          </a:bodyPr>
+          <a:lstStyle/>
+          <a:p>
+            <a:pPr algn="ctr"/>
+            <a:r>
+              <a:rPr lang="en-US" altLang="zh-CN" sz="2000" dirty="0"/>
+              <a:t>cache</a:t>
+            </a:r>
+            <a:r>
+              <a:rPr lang="zh-CN" altLang="en-US" sz="2000" dirty="0"/>
+              <a:t> </a:t>
+            </a:r>
+            <a:r>
+              <a:rPr lang="en-US" altLang="zh-CN" sz="2000" dirty="0"/>
+              <a:t>line</a:t>
+            </a:r>
+            <a:r>
+              <a:rPr lang="zh-CN" altLang="en-US" sz="2000" dirty="0"/>
+              <a:t> </a:t>
+            </a:r>
+            <a:r>
+              <a:rPr lang="en-US" altLang="zh-CN" sz="2000" dirty="0"/>
+              <a:t>size</a:t>
+            </a:r>
+            <a:endParaRPr lang="en-US" sz="2000" dirty="0"/>
+          </a:p>
+        </p:txBody>
+      </p:sp>
+    </p:spTree>
+    <p:extLst>
+      <p:ext uri="{BB962C8B-B14F-4D97-AF65-F5344CB8AC3E}">
+        <p14:creationId xmlns:p14="http://schemas.microsoft.com/office/powerpoint/2010/main" val="915969271"/>
+      </p:ext>
+    </p:extLst>
+  </p:cSld>
+  <p:clrMapOvr>
+    <a:masterClrMapping/>
+  </p:clrMapOvr>
+</p:sld>
+</file>
+
+<file path=ppt/slides/slide2.xml><?xml version="1.0" encoding="utf-8"?>
 <p:sld xmlns:a="http://schemas.openxmlformats.org/drawingml/2006/main" xmlns:r="http://schemas.openxmlformats.org/officeDocument/2006/relationships" xmlns:p="http://schemas.openxmlformats.org/presentationml/2006/main">
   <p:cSld>
     <p:spTree>
@@ -6143,7 +7916,7 @@
 </p:sld>
 </file>
 
-<file path=ppt/slides/slide2.xml><?xml version="1.0" encoding="utf-8"?>
+<file path=ppt/slides/slide3.xml><?xml version="1.0" encoding="utf-8"?>
 <p:sld xmlns:a="http://schemas.openxmlformats.org/drawingml/2006/main" xmlns:r="http://schemas.openxmlformats.org/officeDocument/2006/relationships" xmlns:p="http://schemas.openxmlformats.org/presentationml/2006/main">
   <p:cSld>
     <p:spTree>
@@ -6940,7 +8713,7 @@
 </p:sld>
 </file>
 
-<file path=ppt/slides/slide3.xml><?xml version="1.0" encoding="utf-8"?>
+<file path=ppt/slides/slide4.xml><?xml version="1.0" encoding="utf-8"?>
 <p:sld xmlns:a="http://schemas.openxmlformats.org/drawingml/2006/main" xmlns:r="http://schemas.openxmlformats.org/officeDocument/2006/relationships" xmlns:p="http://schemas.openxmlformats.org/presentationml/2006/main">
   <p:cSld>
     <p:spTree>

</xml_diff>